<commit_message>
formatting changes on presentation
</commit_message>
<xml_diff>
--- a/presentation.pptx
+++ b/presentation.pptx
@@ -110,6 +110,11 @@
       </a:defRPr>
     </a:lvl9pPr>
   </p:defaultTextStyle>
+  <p:extLst>
+    <p:ext uri="{EFAFB233-063F-42B5-8137-9DF3F51BA10A}">
+      <p15:sldGuideLst xmlns:p15="http://schemas.microsoft.com/office/powerpoint/2012/main"/>
+    </p:ext>
+  </p:extLst>
 </p:presentation>
 </file>
 
@@ -2372,6 +2377,7 @@
         <cx:series layoutId="boxWhisker" uniqueId="{1F6D6822-A25E-41A1-B367-DB14C2C445B2}">
           <cx:tx>
             <cx:txData>
+              <cx:f/>
               <cx:v>2016</cx:v>
             </cx:txData>
           </cx:tx>
@@ -2394,6 +2400,7 @@
         <cx:series layoutId="boxWhisker" uniqueId="{3F94D807-669B-4A62-943D-DBFB6FA0507A}">
           <cx:tx>
             <cx:txData>
+              <cx:f/>
               <cx:v>2017</cx:v>
             </cx:txData>
           </cx:tx>
@@ -2416,6 +2423,7 @@
         <cx:series layoutId="boxWhisker" uniqueId="{C6721D98-D2E0-4A23-9B19-F6BFF65B962C}">
           <cx:tx>
             <cx:txData>
+              <cx:f/>
               <cx:v>2018</cx:v>
             </cx:txData>
           </cx:tx>
@@ -2437,6 +2445,7 @@
         <cx:series layoutId="boxWhisker" uniqueId="{7B3AC109-847E-40FA-81B2-5C37C670B634}">
           <cx:tx>
             <cx:txData>
+              <cx:f/>
               <cx:v>2019</cx:v>
             </cx:txData>
           </cx:tx>
@@ -7132,7 +7141,7 @@
           <a:p>
             <a:fld id="{9AB3A824-1A51-4B26-AD58-A6D8E14F6C04}" type="datetimeFigureOut">
               <a:rPr lang="en-US" dirty="0"/>
-              <a:t>7/17/2020</a:t>
+              <a:t>7/18/2020</a:t>
             </a:fld>
             <a:endParaRPr lang="en-US" dirty="0"/>
           </a:p>
@@ -7466,7 +7475,7 @@
           <a:p>
             <a:fld id="{D857E33E-8B18-4087-B112-809917729534}" type="datetimeFigureOut">
               <a:rPr lang="en-US" dirty="0"/>
-              <a:t>7/17/2020</a:t>
+              <a:t>7/18/2020</a:t>
             </a:fld>
             <a:endParaRPr lang="en-US" dirty="0"/>
           </a:p>
@@ -7768,7 +7777,7 @@
           <a:p>
             <a:fld id="{D3FFE419-2371-464F-8239-3959401C3561}" type="datetimeFigureOut">
               <a:rPr lang="en-US" dirty="0"/>
-              <a:t>7/17/2020</a:t>
+              <a:t>7/18/2020</a:t>
             </a:fld>
             <a:endParaRPr lang="en-US" dirty="0"/>
           </a:p>
@@ -8015,7 +8024,7 @@
           <a:p>
             <a:fld id="{97D162C4-EDD9-4389-A98B-B87ECEA2A816}" type="datetimeFigureOut">
               <a:rPr lang="en-US" dirty="0"/>
-              <a:t>7/17/2020</a:t>
+              <a:t>7/18/2020</a:t>
             </a:fld>
             <a:endParaRPr lang="en-US" dirty="0"/>
           </a:p>
@@ -8422,7 +8431,7 @@
           <a:p>
             <a:fld id="{3E5059C3-6A89-4494-99FF-5A4D6FFD50EB}" type="datetimeFigureOut">
               <a:rPr lang="en-US" dirty="0"/>
-              <a:t>7/17/2020</a:t>
+              <a:t>7/18/2020</a:t>
             </a:fld>
             <a:endParaRPr lang="en-US" dirty="0"/>
           </a:p>
@@ -8736,7 +8745,7 @@
           <a:p>
             <a:fld id="{CA954B2F-12DE-47F5-8894-472B206D2E1E}" type="datetimeFigureOut">
               <a:rPr lang="en-US" dirty="0"/>
-              <a:t>7/17/2020</a:t>
+              <a:t>7/18/2020</a:t>
             </a:fld>
             <a:endParaRPr lang="en-US" dirty="0"/>
           </a:p>
@@ -9280,7 +9289,7 @@
           <a:p>
             <a:fld id="{3F30E46F-7819-4ACF-B48B-48222C2ACC88}" type="datetimeFigureOut">
               <a:rPr lang="en-US" dirty="0"/>
-              <a:t>7/17/2020</a:t>
+              <a:t>7/18/2020</a:t>
             </a:fld>
             <a:endParaRPr lang="en-US" dirty="0"/>
           </a:p>
@@ -9475,7 +9484,7 @@
           <a:p>
             <a:fld id="{1FAF3416-4057-4DAA-829D-4CA07428D088}" type="datetimeFigureOut">
               <a:rPr lang="en-US" dirty="0"/>
-              <a:t>7/17/2020</a:t>
+              <a:t>7/18/2020</a:t>
             </a:fld>
             <a:endParaRPr lang="en-US" dirty="0"/>
           </a:p>
@@ -9688,7 +9697,7 @@
           <a:p>
             <a:fld id="{921D9284-D300-4297-87F7-E791DCC15DB1}" type="datetimeFigureOut">
               <a:rPr lang="en-US" dirty="0"/>
-              <a:t>7/17/2020</a:t>
+              <a:t>7/18/2020</a:t>
             </a:fld>
             <a:endParaRPr lang="en-US" dirty="0"/>
           </a:p>
@@ -10057,7 +10066,7 @@
           <a:p>
             <a:fld id="{37D525BB-DA17-4BA0-B3C8-3AC3ABC827E6}" type="datetimeFigureOut">
               <a:rPr lang="en-US" dirty="0"/>
-              <a:t>7/17/2020</a:t>
+              <a:t>7/18/2020</a:t>
             </a:fld>
             <a:endParaRPr lang="en-US" dirty="0"/>
           </a:p>
@@ -10460,7 +10469,7 @@
           <a:p>
             <a:fld id="{B16C4C9A-3960-41CF-A4E9-2A8FB932454B}" type="datetimeFigureOut">
               <a:rPr lang="en-US" dirty="0"/>
-              <a:t>7/17/2020</a:t>
+              <a:t>7/18/2020</a:t>
             </a:fld>
             <a:endParaRPr lang="en-US" dirty="0"/>
           </a:p>
@@ -10771,7 +10780,7 @@
           <a:p>
             <a:fld id="{3CBC1C18-307B-4F68-A007-B5B542270E8D}" type="datetimeFigureOut">
               <a:rPr lang="en-US" dirty="0"/>
-              <a:t>7/17/2020</a:t>
+              <a:t>7/18/2020</a:t>
             </a:fld>
             <a:endParaRPr lang="en-US" dirty="0"/>
           </a:p>
@@ -11495,7 +11504,7 @@
         </p:nvSpPr>
         <p:spPr>
           <a:xfrm>
-            <a:off x="4071234" y="5742167"/>
+            <a:off x="4674707" y="5499652"/>
             <a:ext cx="1447832" cy="307777"/>
           </a:xfrm>
           <a:prstGeom prst="rect">
@@ -11536,8 +11545,8 @@
         </p:nvSpPr>
         <p:spPr>
           <a:xfrm>
-            <a:off x="4228379" y="6049944"/>
-            <a:ext cx="5631029" cy="1015663"/>
+            <a:off x="4831852" y="5807429"/>
+            <a:ext cx="2914388" cy="1384995"/>
           </a:xfrm>
           <a:prstGeom prst="rect">
             <a:avLst/>
@@ -11553,8 +11562,8 @@
             <a:r>
               <a:rPr lang="en-US" sz="1200" dirty="0">
                 <a:solidFill>
-                  <a:schemeClr val="tx1">
-                    <a:lumMod val="85000"/>
+                  <a:schemeClr val="accent1">
+                    <a:lumMod val="75000"/>
                   </a:schemeClr>
                 </a:solidFill>
               </a:rPr>
@@ -11563,8 +11572,8 @@
             <a:r>
               <a:rPr lang="en-US" sz="1200" dirty="0" err="1">
                 <a:solidFill>
-                  <a:schemeClr val="tx1">
-                    <a:lumMod val="85000"/>
+                  <a:schemeClr val="accent1">
+                    <a:lumMod val="75000"/>
                   </a:schemeClr>
                 </a:solidFill>
               </a:rPr>
@@ -11573,18 +11582,42 @@
             <a:r>
               <a:rPr lang="en-US" sz="1200" dirty="0">
                 <a:solidFill>
-                  <a:schemeClr val="tx1">
-                    <a:lumMod val="85000"/>
+                  <a:schemeClr val="accent1">
+                    <a:lumMod val="75000"/>
                   </a:schemeClr>
                 </a:solidFill>
               </a:rPr>
-              <a:t>), MAX(‘sheet_name'!</a:t>
+              <a:t>)</a:t>
+            </a:r>
+            <a:r>
+              <a:rPr lang="en-US" sz="1200" dirty="0">
+                <a:solidFill>
+                  <a:schemeClr val="tx2">
+                    <a:lumMod val="90000"/>
+                  </a:schemeClr>
+                </a:solidFill>
+              </a:rPr>
+              <a:t>, </a:t>
+            </a:r>
+          </a:p>
+          <a:p>
+            <a:r>
+              <a:rPr lang="en-US" sz="1200" dirty="0">
+                <a:solidFill>
+                  <a:schemeClr val="accent1">
+                    <a:lumMod val="60000"/>
+                    <a:lumOff val="40000"/>
+                  </a:schemeClr>
+                </a:solidFill>
+              </a:rPr>
+              <a:t>MAX(‘sheet_name'!</a:t>
             </a:r>
             <a:r>
               <a:rPr lang="en-US" sz="1200" dirty="0" err="1">
                 <a:solidFill>
-                  <a:schemeClr val="tx1">
-                    <a:lumMod val="85000"/>
+                  <a:schemeClr val="accent1">
+                    <a:lumMod val="60000"/>
+                    <a:lumOff val="40000"/>
                   </a:schemeClr>
                 </a:solidFill>
               </a:rPr>
@@ -11593,18 +11626,20 @@
             <a:r>
               <a:rPr lang="en-US" sz="1200" dirty="0">
                 <a:solidFill>
-                  <a:schemeClr val="tx1">
-                    <a:lumMod val="85000"/>
+                  <a:schemeClr val="accent1">
+                    <a:lumMod val="60000"/>
+                    <a:lumOff val="40000"/>
                   </a:schemeClr>
                 </a:solidFill>
               </a:rPr>
-              <a:t>)</a:t>
+              <a:t>),</a:t>
             </a:r>
             <a:br>
               <a:rPr lang="en-US" sz="1200" dirty="0">
                 <a:solidFill>
-                  <a:schemeClr val="tx1">
-                    <a:lumMod val="85000"/>
+                  <a:schemeClr val="accent1">
+                    <a:lumMod val="20000"/>
+                    <a:lumOff val="80000"/>
                   </a:schemeClr>
                 </a:solidFill>
               </a:rPr>
@@ -11612,8 +11647,9 @@
             <a:r>
               <a:rPr lang="en-US" sz="1200" dirty="0">
                 <a:solidFill>
-                  <a:schemeClr val="tx1">
-                    <a:lumMod val="85000"/>
+                  <a:schemeClr val="accent1">
+                    <a:lumMod val="20000"/>
+                    <a:lumOff val="80000"/>
                   </a:schemeClr>
                 </a:solidFill>
               </a:rPr>
@@ -11622,8 +11658,9 @@
             <a:r>
               <a:rPr lang="en-US" sz="1200" dirty="0" err="1">
                 <a:solidFill>
-                  <a:schemeClr val="tx1">
-                    <a:lumMod val="85000"/>
+                  <a:schemeClr val="accent1">
+                    <a:lumMod val="20000"/>
+                    <a:lumOff val="80000"/>
                   </a:schemeClr>
                 </a:solidFill>
               </a:rPr>
@@ -11632,18 +11669,33 @@
             <a:r>
               <a:rPr lang="en-US" sz="1200" dirty="0">
                 <a:solidFill>
-                  <a:schemeClr val="tx1">
-                    <a:lumMod val="85000"/>
+                  <a:schemeClr val="accent1">
+                    <a:lumMod val="20000"/>
+                    <a:lumOff val="80000"/>
                   </a:schemeClr>
                 </a:solidFill>
               </a:rPr>
-              <a:t>), AVERAGE(‘sheet_name'!</a:t>
+              <a:t>), </a:t>
+            </a:r>
+          </a:p>
+          <a:p>
+            <a:r>
+              <a:rPr lang="en-US" sz="1200" dirty="0">
+                <a:solidFill>
+                  <a:schemeClr val="accent3">
+                    <a:lumMod val="20000"/>
+                    <a:lumOff val="80000"/>
+                  </a:schemeClr>
+                </a:solidFill>
+              </a:rPr>
+              <a:t>AVERAGE(‘sheet_name'!</a:t>
             </a:r>
             <a:r>
               <a:rPr lang="en-US" sz="1200" dirty="0" err="1">
                 <a:solidFill>
-                  <a:schemeClr val="tx1">
-                    <a:lumMod val="85000"/>
+                  <a:schemeClr val="accent3">
+                    <a:lumMod val="20000"/>
+                    <a:lumOff val="80000"/>
                   </a:schemeClr>
                 </a:solidFill>
               </a:rPr>
@@ -11652,8 +11704,9 @@
             <a:r>
               <a:rPr lang="en-US" sz="1200" dirty="0">
                 <a:solidFill>
-                  <a:schemeClr val="tx1">
-                    <a:lumMod val="85000"/>
+                  <a:schemeClr val="accent3">
+                    <a:lumMod val="20000"/>
+                    <a:lumOff val="80000"/>
                   </a:schemeClr>
                 </a:solidFill>
               </a:rPr>
@@ -13219,7 +13272,7 @@
         </p:xfrm>
         <a:graphic>
           <a:graphicData uri="http://schemas.openxmlformats.org/drawingml/2006/chart">
-            <c:chart xmlns:c="http://schemas.openxmlformats.org/drawingml/2006/chart" xmlns:r="http://schemas.openxmlformats.org/officeDocument/2006/relationships" r:id="rId3"/>
+            <c:chart xmlns:c="http://schemas.openxmlformats.org/drawingml/2006/chart" xmlns:r="http://schemas.openxmlformats.org/officeDocument/2006/relationships" r:id="rId2"/>
           </a:graphicData>
         </a:graphic>
       </p:graphicFrame>
@@ -13249,7 +13302,7 @@
         </p:xfrm>
         <a:graphic>
           <a:graphicData uri="http://schemas.openxmlformats.org/drawingml/2006/chart">
-            <c:chart xmlns:c="http://schemas.openxmlformats.org/drawingml/2006/chart" xmlns:r="http://schemas.openxmlformats.org/officeDocument/2006/relationships" r:id="rId4"/>
+            <c:chart xmlns:c="http://schemas.openxmlformats.org/drawingml/2006/chart" xmlns:r="http://schemas.openxmlformats.org/officeDocument/2006/relationships" r:id="rId3"/>
           </a:graphicData>
         </a:graphic>
       </p:graphicFrame>
@@ -13279,7 +13332,7 @@
         </p:xfrm>
         <a:graphic>
           <a:graphicData uri="http://schemas.openxmlformats.org/drawingml/2006/chart">
-            <c:chart xmlns:c="http://schemas.openxmlformats.org/drawingml/2006/chart" xmlns:r="http://schemas.openxmlformats.org/officeDocument/2006/relationships" r:id="rId5"/>
+            <c:chart xmlns:c="http://schemas.openxmlformats.org/drawingml/2006/chart" xmlns:r="http://schemas.openxmlformats.org/officeDocument/2006/relationships" r:id="rId4"/>
           </a:graphicData>
         </a:graphic>
       </p:graphicFrame>
@@ -13309,7 +13362,7 @@
         </p:xfrm>
         <a:graphic>
           <a:graphicData uri="http://schemas.openxmlformats.org/drawingml/2006/chart">
-            <c:chart xmlns:c="http://schemas.openxmlformats.org/drawingml/2006/chart" xmlns:r="http://schemas.openxmlformats.org/officeDocument/2006/relationships" r:id="rId6"/>
+            <c:chart xmlns:c="http://schemas.openxmlformats.org/drawingml/2006/chart" xmlns:r="http://schemas.openxmlformats.org/officeDocument/2006/relationships" r:id="rId5"/>
           </a:graphicData>
         </a:graphic>
       </p:graphicFrame>
@@ -13369,7 +13422,7 @@
         <p:spPr>
           <a:xfrm>
             <a:off x="2471183" y="6160264"/>
-            <a:ext cx="7285969" cy="461665"/>
+            <a:ext cx="3791423" cy="646331"/>
           </a:xfrm>
           <a:prstGeom prst="rect">
             <a:avLst/>
@@ -13385,8 +13438,9 @@
             <a:r>
               <a:rPr lang="en-US" sz="1200" dirty="0">
                 <a:solidFill>
-                  <a:schemeClr val="bg1">
-                    <a:lumMod val="50000"/>
+                  <a:schemeClr val="tx1">
+                    <a:lumMod val="85000"/>
+                    <a:lumOff val="15000"/>
                   </a:schemeClr>
                 </a:solidFill>
               </a:rPr>
@@ -13395,12 +13449,24 @@
             <a:r>
               <a:rPr lang="en-US" sz="1200" dirty="0" err="1">
                 <a:solidFill>
-                  <a:schemeClr val="bg1">
-                    <a:lumMod val="50000"/>
+                  <a:schemeClr val="tx1">
+                    <a:lumMod val="85000"/>
+                    <a:lumOff val="15000"/>
                   </a:schemeClr>
                 </a:solidFill>
               </a:rPr>
               <a:t>times_column</a:t>
+            </a:r>
+            <a:r>
+              <a:rPr lang="en-US" sz="1200" dirty="0">
+                <a:solidFill>
+                  <a:schemeClr val="tx1">
+                    <a:lumMod val="85000"/>
+                    <a:lumOff val="15000"/>
+                  </a:schemeClr>
+                </a:solidFill>
+              </a:rPr>
+              <a:t>,"&lt;04:29:20")</a:t>
             </a:r>
             <a:r>
               <a:rPr lang="en-US" sz="1200" dirty="0">
@@ -13410,13 +13476,27 @@
                   </a:schemeClr>
                 </a:solidFill>
               </a:rPr>
-              <a:t>,"&lt;04:29:20"), MAX(‘</a:t>
+              <a:t>, </a:t>
+            </a:r>
+          </a:p>
+          <a:p>
+            <a:r>
+              <a:rPr lang="en-US" sz="1200" dirty="0">
+                <a:solidFill>
+                  <a:schemeClr val="tx1">
+                    <a:lumMod val="65000"/>
+                    <a:lumOff val="35000"/>
+                  </a:schemeClr>
+                </a:solidFill>
+              </a:rPr>
+              <a:t>MAX(‘</a:t>
             </a:r>
             <a:r>
               <a:rPr lang="en-US" sz="1200" dirty="0" err="1">
                 <a:solidFill>
-                  <a:schemeClr val="bg1">
-                    <a:lumMod val="50000"/>
+                  <a:schemeClr val="tx1">
+                    <a:lumMod val="65000"/>
+                    <a:lumOff val="35000"/>
                   </a:schemeClr>
                 </a:solidFill>
               </a:rPr>
@@ -13425,8 +13505,9 @@
             <a:r>
               <a:rPr lang="en-US" sz="1200" dirty="0">
                 <a:solidFill>
-                  <a:schemeClr val="bg1">
-                    <a:lumMod val="50000"/>
+                  <a:schemeClr val="tx1">
+                    <a:lumMod val="65000"/>
+                    <a:lumOff val="35000"/>
                   </a:schemeClr>
                 </a:solidFill>
               </a:rPr>
@@ -13435,8 +13516,9 @@
             <a:r>
               <a:rPr lang="en-US" sz="1200" dirty="0" err="1">
                 <a:solidFill>
-                  <a:schemeClr val="bg1">
-                    <a:lumMod val="50000"/>
+                  <a:schemeClr val="tx1">
+                    <a:lumMod val="65000"/>
+                    <a:lumOff val="35000"/>
                   </a:schemeClr>
                 </a:solidFill>
               </a:rPr>
@@ -13445,8 +13527,9 @@
             <a:r>
               <a:rPr lang="en-US" sz="1200" dirty="0">
                 <a:solidFill>
-                  <a:schemeClr val="bg1">
-                    <a:lumMod val="50000"/>
+                  <a:schemeClr val="tx1">
+                    <a:lumMod val="65000"/>
+                    <a:lumOff val="35000"/>
                   </a:schemeClr>
                 </a:solidFill>
               </a:rPr>
@@ -13455,8 +13538,9 @@
             <a:r>
               <a:rPr lang="en-US" sz="1200" dirty="0" err="1">
                 <a:solidFill>
-                  <a:schemeClr val="bg1">
-                    <a:lumMod val="50000"/>
+                  <a:schemeClr val="tx1">
+                    <a:lumMod val="65000"/>
+                    <a:lumOff val="35000"/>
                   </a:schemeClr>
                 </a:solidFill>
               </a:rPr>
@@ -13465,8 +13549,9 @@
             <a:r>
               <a:rPr lang="en-US" sz="1200" dirty="0">
                 <a:solidFill>
-                  <a:schemeClr val="bg1">
-                    <a:lumMod val="50000"/>
+                  <a:schemeClr val="tx1">
+                    <a:lumMod val="65000"/>
+                    <a:lumOff val="35000"/>
                   </a:schemeClr>
                 </a:solidFill>
               </a:rPr>
@@ -13631,7 +13716,7 @@
         <p:spPr>
           <a:xfrm>
             <a:off x="4192938" y="6049944"/>
-            <a:ext cx="4972836" cy="461665"/>
+            <a:ext cx="4022704" cy="646331"/>
           </a:xfrm>
           <a:prstGeom prst="rect">
             <a:avLst/>
@@ -13647,8 +13732,8 @@
             <a:r>
               <a:rPr lang="en-US" sz="1200" dirty="0">
                 <a:solidFill>
-                  <a:schemeClr val="tx1">
-                    <a:lumMod val="85000"/>
+                  <a:schemeClr val="accent1">
+                    <a:lumMod val="75000"/>
                   </a:schemeClr>
                 </a:solidFill>
               </a:rPr>
@@ -13657,8 +13742,8 @@
             <a:r>
               <a:rPr lang="en-US" sz="1200" dirty="0" err="1">
                 <a:solidFill>
-                  <a:schemeClr val="tx1">
-                    <a:lumMod val="85000"/>
+                  <a:schemeClr val="accent1">
+                    <a:lumMod val="75000"/>
                   </a:schemeClr>
                 </a:solidFill>
               </a:rPr>
@@ -13667,18 +13752,32 @@
             <a:r>
               <a:rPr lang="en-US" sz="1200" dirty="0">
                 <a:solidFill>
-                  <a:schemeClr val="tx1">
-                    <a:lumMod val="85000"/>
+                  <a:schemeClr val="accent1">
+                    <a:lumMod val="75000"/>
                   </a:schemeClr>
                 </a:solidFill>
               </a:rPr>
-              <a:t>),MAX(‘</a:t>
+              <a:t>),</a:t>
+            </a:r>
+          </a:p>
+          <a:p>
+            <a:r>
+              <a:rPr lang="en-US" sz="1200" dirty="0">
+                <a:solidFill>
+                  <a:schemeClr val="accent1">
+                    <a:lumMod val="60000"/>
+                    <a:lumOff val="40000"/>
+                  </a:schemeClr>
+                </a:solidFill>
+              </a:rPr>
+              <a:t>MAX(‘</a:t>
             </a:r>
             <a:r>
               <a:rPr lang="en-US" sz="1200" dirty="0" err="1">
                 <a:solidFill>
-                  <a:schemeClr val="tx1">
-                    <a:lumMod val="85000"/>
+                  <a:schemeClr val="accent1">
+                    <a:lumMod val="60000"/>
+                    <a:lumOff val="40000"/>
                   </a:schemeClr>
                 </a:solidFill>
               </a:rPr>
@@ -13687,8 +13786,9 @@
             <a:r>
               <a:rPr lang="en-US" sz="1200" dirty="0">
                 <a:solidFill>
-                  <a:schemeClr val="tx1">
-                    <a:lumMod val="85000"/>
+                  <a:schemeClr val="accent1">
+                    <a:lumMod val="60000"/>
+                    <a:lumOff val="40000"/>
                   </a:schemeClr>
                 </a:solidFill>
               </a:rPr>
@@ -13697,8 +13797,9 @@
             <a:r>
               <a:rPr lang="en-US" sz="1200" dirty="0" err="1">
                 <a:solidFill>
-                  <a:schemeClr val="tx1">
-                    <a:lumMod val="85000"/>
+                  <a:schemeClr val="accent1">
+                    <a:lumMod val="60000"/>
+                    <a:lumOff val="40000"/>
                   </a:schemeClr>
                 </a:solidFill>
               </a:rPr>
@@ -13707,8 +13808,9 @@
             <a:r>
               <a:rPr lang="en-US" sz="1200" dirty="0">
                 <a:solidFill>
-                  <a:schemeClr val="tx1">
-                    <a:lumMod val="85000"/>
+                  <a:schemeClr val="accent1">
+                    <a:lumMod val="60000"/>
+                    <a:lumOff val="40000"/>
                   </a:schemeClr>
                 </a:solidFill>
               </a:rPr>
@@ -13719,8 +13821,9 @@
             <a:r>
               <a:rPr lang="en-US" sz="1200" dirty="0">
                 <a:solidFill>
-                  <a:schemeClr val="tx1">
-                    <a:lumMod val="85000"/>
+                  <a:schemeClr val="accent1">
+                    <a:lumMod val="20000"/>
+                    <a:lumOff val="80000"/>
                   </a:schemeClr>
                 </a:solidFill>
               </a:rPr>
@@ -13729,8 +13832,9 @@
             <a:r>
               <a:rPr lang="en-US" sz="1200" dirty="0" err="1">
                 <a:solidFill>
-                  <a:schemeClr val="tx1">
-                    <a:lumMod val="85000"/>
+                  <a:schemeClr val="accent1">
+                    <a:lumMod val="20000"/>
+                    <a:lumOff val="80000"/>
                   </a:schemeClr>
                 </a:solidFill>
               </a:rPr>
@@ -13739,8 +13843,9 @@
             <a:r>
               <a:rPr lang="en-US" sz="1200" dirty="0">
                 <a:solidFill>
-                  <a:schemeClr val="tx1">
-                    <a:lumMod val="85000"/>
+                  <a:schemeClr val="accent1">
+                    <a:lumMod val="20000"/>
+                    <a:lumOff val="80000"/>
                   </a:schemeClr>
                 </a:solidFill>
               </a:rPr>
@@ -13749,8 +13854,8 @@
           </a:p>
         </p:txBody>
       </p:sp>
-      <mc:AlternateContent xmlns:mc="http://schemas.openxmlformats.org/markup-compatibility/2006">
-        <mc:Choice xmlns:cx1="http://schemas.microsoft.com/office/drawing/2015/9/8/chartex" Requires="cx1">
+      <mc:AlternateContent xmlns:mc="http://schemas.openxmlformats.org/markup-compatibility/2006" xmlns:cx1="http://schemas.microsoft.com/office/drawing/2015/9/8/chartex">
+        <mc:Choice Requires="cx1">
           <p:graphicFrame>
             <p:nvGraphicFramePr>
               <p:cNvPr id="11" name="Content Placeholder 10">
@@ -13783,7 +13888,7 @@
             </a:graphic>
           </p:graphicFrame>
         </mc:Choice>
-        <mc:Fallback>
+        <mc:Fallback xmlns="">
           <p:pic>
             <p:nvPicPr>
               <p:cNvPr id="11" name="Content Placeholder 10">
@@ -14750,8 +14855,9 @@
             <a:r>
               <a:rPr lang="en-US" sz="1200" dirty="0">
                 <a:solidFill>
-                  <a:schemeClr val="bg1">
-                    <a:lumMod val="50000"/>
+                  <a:schemeClr val="tx1">
+                    <a:lumMod val="65000"/>
+                    <a:lumOff val="35000"/>
                   </a:schemeClr>
                 </a:solidFill>
               </a:rPr>
@@ -14760,53 +14866,23 @@
           </a:p>
           <a:p>
             <a:r>
-              <a:rPr lang="en-US" sz="1200" dirty="0">
-                <a:solidFill>
-                  <a:schemeClr val="bg1">
-                    <a:lumMod val="50000"/>
-                  </a:schemeClr>
-                </a:solidFill>
-              </a:rPr>
+              <a:rPr lang="en-US" sz="1200" dirty="0"/>
               <a:t>2</a:t>
             </a:r>
             <a:r>
-              <a:rPr lang="en-US" sz="1200" baseline="30000" dirty="0">
-                <a:solidFill>
-                  <a:schemeClr val="bg1">
-                    <a:lumMod val="50000"/>
-                  </a:schemeClr>
-                </a:solidFill>
-              </a:rPr>
+              <a:rPr lang="en-US" sz="1200" baseline="30000" dirty="0"/>
               <a:t>nd</a:t>
             </a:r>
             <a:r>
-              <a:rPr lang="en-US" sz="1200" dirty="0">
-                <a:solidFill>
-                  <a:schemeClr val="bg1">
-                    <a:lumMod val="50000"/>
-                  </a:schemeClr>
-                </a:solidFill>
-              </a:rPr>
+              <a:rPr lang="en-US" sz="1200" dirty="0"/>
               <a:t>_place_time – 1</a:t>
             </a:r>
             <a:r>
-              <a:rPr lang="en-US" sz="1200" baseline="30000" dirty="0">
-                <a:solidFill>
-                  <a:schemeClr val="bg1">
-                    <a:lumMod val="50000"/>
-                  </a:schemeClr>
-                </a:solidFill>
-              </a:rPr>
+              <a:rPr lang="en-US" sz="1200" baseline="30000" dirty="0"/>
               <a:t>st</a:t>
             </a:r>
             <a:r>
-              <a:rPr lang="en-US" sz="1200" dirty="0">
-                <a:solidFill>
-                  <a:schemeClr val="bg1">
-                    <a:lumMod val="50000"/>
-                  </a:schemeClr>
-                </a:solidFill>
-              </a:rPr>
+              <a:rPr lang="en-US" sz="1200" dirty="0"/>
               <a:t>_place_time</a:t>
             </a:r>
           </a:p>
@@ -22548,12 +22624,22 @@
             <a:r>
               <a:rPr lang="en-US" sz="1200" dirty="0">
                 <a:solidFill>
+                  <a:schemeClr val="accent1">
+                    <a:lumMod val="75000"/>
+                  </a:schemeClr>
+                </a:solidFill>
+              </a:rPr>
+              <a:t>FILTER('2016_full_marathon'!$D:$D,('2016_full_marathon'!$A:$A&lt;MIN('2016_full_marathon'!$A:$A)+3)*('2016_full_marathon'!$A:$A&lt;&gt;"")),</a:t>
+            </a:r>
+            <a:r>
+              <a:rPr lang="en-US" sz="1200" dirty="0">
+                <a:solidFill>
                   <a:schemeClr val="bg1">
                     <a:lumMod val="50000"/>
                   </a:schemeClr>
                 </a:solidFill>
               </a:rPr>
-              <a:t>FILTER('2016_full_marathon'!$D:$D,('2016_full_marathon'!$A:$A&lt;MIN('2016_full_marathon'!$A:$A)+3)*('2016_full_marathon'!$A:$A&lt;&gt;"")), </a:t>
+              <a:t> </a:t>
             </a:r>
             <a:br>
               <a:rPr lang="en-US" sz="1200" dirty="0">
@@ -22567,8 +22653,9 @@
             <a:r>
               <a:rPr lang="en-US" sz="1200" dirty="0">
                 <a:solidFill>
-                  <a:schemeClr val="bg1">
-                    <a:lumMod val="50000"/>
+                  <a:schemeClr val="accent1">
+                    <a:lumMod val="60000"/>
+                    <a:lumOff val="40000"/>
                   </a:schemeClr>
                 </a:solidFill>
               </a:rPr>
@@ -22586,8 +22673,9 @@
             <a:r>
               <a:rPr lang="en-US" sz="1200" dirty="0">
                 <a:solidFill>
-                  <a:schemeClr val="bg1">
-                    <a:lumMod val="50000"/>
+                  <a:schemeClr val="accent1">
+                    <a:lumMod val="20000"/>
+                    <a:lumOff val="80000"/>
                   </a:schemeClr>
                 </a:solidFill>
               </a:rPr>
@@ -22596,8 +22684,9 @@
             <a:r>
               <a:rPr lang="en-US" sz="1200" dirty="0" err="1">
                 <a:solidFill>
-                  <a:schemeClr val="bg1">
-                    <a:lumMod val="50000"/>
+                  <a:schemeClr val="accent1">
+                    <a:lumMod val="20000"/>
+                    <a:lumOff val="80000"/>
                   </a:schemeClr>
                 </a:solidFill>
               </a:rPr>
@@ -22606,8 +22695,9 @@
             <a:r>
               <a:rPr lang="en-US" sz="1200" dirty="0">
                 <a:solidFill>
-                  <a:schemeClr val="bg1">
-                    <a:lumMod val="50000"/>
+                  <a:schemeClr val="accent1">
+                    <a:lumMod val="20000"/>
+                    <a:lumOff val="80000"/>
                   </a:schemeClr>
                 </a:solidFill>
               </a:rPr>
@@ -22616,8 +22706,9 @@
             <a:r>
               <a:rPr lang="en-US" sz="1200" dirty="0" err="1">
                 <a:solidFill>
-                  <a:schemeClr val="bg1">
-                    <a:lumMod val="50000"/>
+                  <a:schemeClr val="accent1">
+                    <a:lumMod val="20000"/>
+                    <a:lumOff val="80000"/>
                   </a:schemeClr>
                 </a:solidFill>
               </a:rPr>
@@ -22626,8 +22717,9 @@
             <a:r>
               <a:rPr lang="en-US" sz="1200" dirty="0">
                 <a:solidFill>
-                  <a:schemeClr val="bg1">
-                    <a:lumMod val="50000"/>
+                  <a:schemeClr val="accent1">
+                    <a:lumMod val="20000"/>
+                    <a:lumOff val="80000"/>
                   </a:schemeClr>
                 </a:solidFill>
               </a:rPr>

</xml_diff>

<commit_message>
changes to formulas in the presentation to make them easier to read
</commit_message>
<xml_diff>
--- a/presentation.pptx
+++ b/presentation.pptx
@@ -14827,7 +14827,7 @@
         <p:spPr>
           <a:xfrm>
             <a:off x="3131730" y="6161221"/>
-            <a:ext cx="8497839" cy="646331"/>
+            <a:ext cx="7485191" cy="646331"/>
           </a:xfrm>
           <a:prstGeom prst="rect">
             <a:avLst/>
@@ -14848,7 +14848,27 @@
                   </a:schemeClr>
                 </a:solidFill>
               </a:rPr>
-              <a:t>VLOOKUP(MIN('2016_full_marathon’!ID_column),'2016_full_marathon’!full_data_range, #_of_cell_in_range_to_return), </a:t>
+              <a:t>VLOOKUP(MIN(‘sheet_name’!</a:t>
+            </a:r>
+            <a:r>
+              <a:rPr lang="en-US" sz="1200" dirty="0" err="1">
+                <a:solidFill>
+                  <a:schemeClr val="bg1">
+                    <a:lumMod val="50000"/>
+                  </a:schemeClr>
+                </a:solidFill>
+              </a:rPr>
+              <a:t>ID_column</a:t>
+            </a:r>
+            <a:r>
+              <a:rPr lang="en-US" sz="1200" dirty="0">
+                <a:solidFill>
+                  <a:schemeClr val="bg1">
+                    <a:lumMod val="50000"/>
+                  </a:schemeClr>
+                </a:solidFill>
+              </a:rPr>
+              <a:t>),’sheet_name’!full_data_range, #_of_cell_in_range_to_return), </a:t>
             </a:r>
           </a:p>
           <a:p>
@@ -14861,7 +14881,7 @@
                   </a:schemeClr>
                 </a:solidFill>
               </a:rPr>
-              <a:t>VLOOKUP(MIN('2016_full_marathon'!ID_column)+1,'2016_full_marathon’!full_data_range , #_of_cell_in_range_to_return),</a:t>
+              <a:t>VLOOKUP(MIN(‘sheet_name'!ID_column)+1,’sheet_name’!full_data_range , #_of_cell_in_range_to_return),</a:t>
             </a:r>
           </a:p>
           <a:p>
@@ -15152,7 +15172,7 @@
             <p:ph idx="1"/>
             <p:extLst>
               <p:ext uri="{D42A27DB-BD31-4B8C-83A1-F6EECF244321}">
-                <p14:modId xmlns:p14="http://schemas.microsoft.com/office/powerpoint/2010/main" val="1286150539"/>
+                <p14:modId xmlns:p14="http://schemas.microsoft.com/office/powerpoint/2010/main" val="266219613"/>
               </p:ext>
             </p:extLst>
           </p:nvPr>
@@ -15427,11 +15447,14 @@
                       <a:noFill/>
                       <a:prstDash val="solid"/>
                     </a:lnT>
-                    <a:lnB w="38100" cap="flat" cmpd="sng" algn="ctr">
-                      <a:solidFill>
-                        <a:srgbClr val="FFFFFF"/>
-                      </a:solidFill>
-                      <a:prstDash val="solid"/>
+                    <a:lnB w="12700" cap="flat" cmpd="sng" algn="ctr">
+                      <a:solidFill>
+                        <a:schemeClr val="tx1"/>
+                      </a:solidFill>
+                      <a:prstDash val="solid"/>
+                      <a:round/>
+                      <a:headEnd type="none" w="med" len="med"/>
+                      <a:tailEnd type="none" w="med" len="med"/>
                     </a:lnB>
                     <a:solidFill>
                       <a:srgbClr val="636B68">
@@ -15481,11 +15504,14 @@
                       <a:noFill/>
                       <a:prstDash val="solid"/>
                     </a:lnT>
-                    <a:lnB w="38100" cap="flat" cmpd="sng" algn="ctr">
-                      <a:solidFill>
-                        <a:srgbClr val="FFFFFF"/>
-                      </a:solidFill>
-                      <a:prstDash val="solid"/>
+                    <a:lnB w="12700" cap="flat" cmpd="sng" algn="ctr">
+                      <a:solidFill>
+                        <a:schemeClr val="tx1"/>
+                      </a:solidFill>
+                      <a:prstDash val="solid"/>
+                      <a:round/>
+                      <a:headEnd type="none" w="med" len="med"/>
+                      <a:tailEnd type="none" w="med" len="med"/>
                     </a:lnB>
                     <a:solidFill>
                       <a:srgbClr val="636B68">
@@ -15526,11 +15552,14 @@
                       <a:noFill/>
                       <a:prstDash val="solid"/>
                     </a:lnT>
-                    <a:lnB w="38100" cap="flat" cmpd="sng" algn="ctr">
-                      <a:solidFill>
-                        <a:srgbClr val="FFFFFF"/>
-                      </a:solidFill>
-                      <a:prstDash val="solid"/>
+                    <a:lnB w="12700" cap="flat" cmpd="sng" algn="ctr">
+                      <a:solidFill>
+                        <a:schemeClr val="tx1"/>
+                      </a:solidFill>
+                      <a:prstDash val="solid"/>
+                      <a:round/>
+                      <a:headEnd type="none" w="med" len="med"/>
+                      <a:tailEnd type="none" w="med" len="med"/>
                     </a:lnB>
                     <a:solidFill>
                       <a:srgbClr val="636B68">
@@ -15580,9 +15609,9 @@
                       <a:noFill/>
                       <a:prstDash val="solid"/>
                     </a:lnT>
-                    <a:lnB w="38100" cap="flat" cmpd="sng" algn="ctr">
-                      <a:solidFill>
-                        <a:srgbClr val="FFFFFF"/>
+                    <a:lnB w="12700" cap="flat" cmpd="sng" algn="ctr">
+                      <a:solidFill>
+                        <a:schemeClr val="tx1"/>
                       </a:solidFill>
                       <a:prstDash val="solid"/>
                       <a:round/>
@@ -15637,9 +15666,9 @@
                       <a:noFill/>
                       <a:prstDash val="solid"/>
                     </a:lnT>
-                    <a:lnB w="38100" cap="flat" cmpd="sng" algn="ctr">
-                      <a:solidFill>
-                        <a:srgbClr val="FFFFFF"/>
+                    <a:lnB w="12700" cap="flat" cmpd="sng" algn="ctr">
+                      <a:solidFill>
+                        <a:schemeClr val="tx1"/>
                       </a:solidFill>
                       <a:prstDash val="solid"/>
                       <a:round/>
@@ -15694,9 +15723,9 @@
                       <a:noFill/>
                       <a:prstDash val="solid"/>
                     </a:lnT>
-                    <a:lnB w="38100" cap="flat" cmpd="sng" algn="ctr">
-                      <a:solidFill>
-                        <a:srgbClr val="FFFFFF"/>
+                    <a:lnB w="12700" cap="flat" cmpd="sng" algn="ctr">
+                      <a:solidFill>
+                        <a:schemeClr val="tx1"/>
                       </a:solidFill>
                       <a:prstDash val="solid"/>
                       <a:round/>
@@ -15749,9 +15778,9 @@
                       <a:noFill/>
                       <a:prstDash val="solid"/>
                     </a:lnT>
-                    <a:lnB w="38100" cap="flat" cmpd="sng" algn="ctr">
-                      <a:solidFill>
-                        <a:srgbClr val="FFFFFF"/>
+                    <a:lnB w="12700" cap="flat" cmpd="sng" algn="ctr">
+                      <a:solidFill>
+                        <a:schemeClr val="tx1"/>
                       </a:solidFill>
                       <a:prstDash val="solid"/>
                       <a:round/>
@@ -15946,11 +15975,14 @@
                       <a:headEnd type="none" w="med" len="med"/>
                       <a:tailEnd type="none" w="med" len="med"/>
                     </a:lnL>
-                    <a:lnR w="38100" cap="flat" cmpd="sng" algn="ctr">
-                      <a:solidFill>
-                        <a:srgbClr val="FFFFFF"/>
-                      </a:solidFill>
-                      <a:prstDash val="solid"/>
+                    <a:lnR w="12700" cap="flat" cmpd="sng" algn="ctr">
+                      <a:solidFill>
+                        <a:schemeClr val="tx1"/>
+                      </a:solidFill>
+                      <a:prstDash val="solid"/>
+                      <a:round/>
+                      <a:headEnd type="none" w="med" len="med"/>
+                      <a:tailEnd type="none" w="med" len="med"/>
                     </a:lnR>
                     <a:lnT w="38100" cap="flat" cmpd="sng" algn="ctr">
                       <a:solidFill>
@@ -16014,11 +16046,14 @@
                     </a:p>
                   </a:txBody>
                   <a:tcPr marL="98405" marR="59043" marT="59043" marB="59043" anchor="b">
-                    <a:lnL w="38100" cap="flat" cmpd="sng" algn="ctr">
-                      <a:solidFill>
-                        <a:srgbClr val="FFFFFF"/>
-                      </a:solidFill>
-                      <a:prstDash val="solid"/>
+                    <a:lnL w="12700" cap="flat" cmpd="sng" algn="ctr">
+                      <a:solidFill>
+                        <a:schemeClr val="tx1"/>
+                      </a:solidFill>
+                      <a:prstDash val="solid"/>
+                      <a:round/>
+                      <a:headEnd type="none" w="med" len="med"/>
+                      <a:tailEnd type="none" w="med" len="med"/>
                     </a:lnL>
                     <a:lnR w="38100" cap="flat" cmpd="sng" algn="ctr">
                       <a:solidFill>
@@ -16026,11 +16061,14 @@
                       </a:solidFill>
                       <a:prstDash val="solid"/>
                     </a:lnR>
-                    <a:lnT w="38100" cap="flat" cmpd="sng" algn="ctr">
-                      <a:solidFill>
-                        <a:srgbClr val="FFFFFF"/>
-                      </a:solidFill>
-                      <a:prstDash val="solid"/>
+                    <a:lnT w="12700" cap="flat" cmpd="sng" algn="ctr">
+                      <a:solidFill>
+                        <a:schemeClr val="tx1"/>
+                      </a:solidFill>
+                      <a:prstDash val="solid"/>
+                      <a:round/>
+                      <a:headEnd type="none" w="med" len="med"/>
+                      <a:tailEnd type="none" w="med" len="med"/>
                     </a:lnT>
                     <a:lnB w="38100" cap="flat" cmpd="sng" algn="ctr">
                       <a:solidFill>
@@ -16088,11 +16126,14 @@
                       </a:solidFill>
                       <a:prstDash val="solid"/>
                     </a:lnR>
-                    <a:lnT w="38100" cap="flat" cmpd="sng" algn="ctr">
-                      <a:solidFill>
-                        <a:srgbClr val="FFFFFF"/>
-                      </a:solidFill>
-                      <a:prstDash val="solid"/>
+                    <a:lnT w="12700" cap="flat" cmpd="sng" algn="ctr">
+                      <a:solidFill>
+                        <a:schemeClr val="tx1"/>
+                      </a:solidFill>
+                      <a:prstDash val="solid"/>
+                      <a:round/>
+                      <a:headEnd type="none" w="med" len="med"/>
+                      <a:tailEnd type="none" w="med" len="med"/>
                     </a:lnT>
                     <a:lnB w="38100" cap="flat" cmpd="sng" algn="ctr">
                       <a:solidFill>
@@ -16141,11 +16182,14 @@
                       <a:headEnd type="none" w="med" len="med"/>
                       <a:tailEnd type="none" w="med" len="med"/>
                     </a:lnR>
-                    <a:lnT w="38100" cap="flat" cmpd="sng" algn="ctr">
-                      <a:solidFill>
-                        <a:srgbClr val="FFFFFF"/>
-                      </a:solidFill>
-                      <a:prstDash val="solid"/>
+                    <a:lnT w="12700" cap="flat" cmpd="sng" algn="ctr">
+                      <a:solidFill>
+                        <a:schemeClr val="tx1"/>
+                      </a:solidFill>
+                      <a:prstDash val="solid"/>
+                      <a:round/>
+                      <a:headEnd type="none" w="med" len="med"/>
+                      <a:tailEnd type="none" w="med" len="med"/>
                     </a:lnT>
                     <a:lnB w="38100" cap="flat" cmpd="sng" algn="ctr">
                       <a:solidFill>
@@ -16191,11 +16235,14 @@
                       </a:solidFill>
                       <a:prstDash val="solid"/>
                     </a:lnR>
-                    <a:lnT w="38100" cap="flat" cmpd="sng" algn="ctr">
-                      <a:solidFill>
-                        <a:srgbClr val="FFFFFF"/>
-                      </a:solidFill>
-                      <a:prstDash val="solid"/>
+                    <a:lnT w="12700" cap="flat" cmpd="sng" algn="ctr">
+                      <a:solidFill>
+                        <a:schemeClr val="tx1"/>
+                      </a:solidFill>
+                      <a:prstDash val="solid"/>
+                      <a:round/>
+                      <a:headEnd type="none" w="med" len="med"/>
+                      <a:tailEnd type="none" w="med" len="med"/>
                     </a:lnT>
                     <a:lnB w="38100" cap="flat" cmpd="sng" algn="ctr">
                       <a:solidFill>
@@ -16241,11 +16288,14 @@
                       </a:solidFill>
                       <a:prstDash val="solid"/>
                     </a:lnR>
-                    <a:lnT w="38100" cap="flat" cmpd="sng" algn="ctr">
-                      <a:solidFill>
-                        <a:srgbClr val="FFFFFF"/>
-                      </a:solidFill>
-                      <a:prstDash val="solid"/>
+                    <a:lnT w="12700" cap="flat" cmpd="sng" algn="ctr">
+                      <a:solidFill>
+                        <a:schemeClr val="tx1"/>
+                      </a:solidFill>
+                      <a:prstDash val="solid"/>
+                      <a:round/>
+                      <a:headEnd type="none" w="med" len="med"/>
+                      <a:tailEnd type="none" w="med" len="med"/>
                     </a:lnT>
                     <a:lnB w="38100" cap="flat" cmpd="sng" algn="ctr">
                       <a:solidFill>
@@ -16291,11 +16341,14 @@
                       </a:solidFill>
                       <a:prstDash val="solid"/>
                     </a:lnR>
-                    <a:lnT w="38100" cap="flat" cmpd="sng" algn="ctr">
-                      <a:solidFill>
-                        <a:srgbClr val="FFFFFF"/>
-                      </a:solidFill>
-                      <a:prstDash val="solid"/>
+                    <a:lnT w="12700" cap="flat" cmpd="sng" algn="ctr">
+                      <a:solidFill>
+                        <a:schemeClr val="tx1"/>
+                      </a:solidFill>
+                      <a:prstDash val="solid"/>
+                      <a:round/>
+                      <a:headEnd type="none" w="med" len="med"/>
+                      <a:tailEnd type="none" w="med" len="med"/>
                     </a:lnT>
                     <a:lnB w="38100" cap="flat" cmpd="sng" algn="ctr">
                       <a:solidFill>
@@ -16335,15 +16388,23 @@
                       </a:solidFill>
                       <a:prstDash val="solid"/>
                     </a:lnL>
-                    <a:lnR w="38100" cap="flat" cmpd="sng" algn="ctr">
-                      <a:noFill/>
-                      <a:prstDash val="solid"/>
+                    <a:lnR w="12700" cap="flat" cmpd="sng" algn="ctr">
+                      <a:solidFill>
+                        <a:schemeClr val="tx1"/>
+                      </a:solidFill>
+                      <a:prstDash val="solid"/>
+                      <a:round/>
+                      <a:headEnd type="none" w="med" len="med"/>
+                      <a:tailEnd type="none" w="med" len="med"/>
                     </a:lnR>
-                    <a:lnT w="38100" cap="flat" cmpd="sng" algn="ctr">
-                      <a:solidFill>
-                        <a:srgbClr val="FFFFFF"/>
-                      </a:solidFill>
-                      <a:prstDash val="solid"/>
+                    <a:lnT w="12700" cap="flat" cmpd="sng" algn="ctr">
+                      <a:solidFill>
+                        <a:schemeClr val="tx1"/>
+                      </a:solidFill>
+                      <a:prstDash val="solid"/>
+                      <a:round/>
+                      <a:headEnd type="none" w="med" len="med"/>
+                      <a:tailEnd type="none" w="med" len="med"/>
                     </a:lnT>
                     <a:lnB w="38100" cap="flat" cmpd="sng" algn="ctr">
                       <a:solidFill>
@@ -16512,11 +16573,14 @@
                       <a:headEnd type="none" w="med" len="med"/>
                       <a:tailEnd type="none" w="med" len="med"/>
                     </a:lnL>
-                    <a:lnR w="38100" cap="flat" cmpd="sng" algn="ctr">
-                      <a:solidFill>
-                        <a:srgbClr val="FFFFFF"/>
-                      </a:solidFill>
-                      <a:prstDash val="solid"/>
+                    <a:lnR w="12700" cap="flat" cmpd="sng" algn="ctr">
+                      <a:solidFill>
+                        <a:schemeClr val="tx1"/>
+                      </a:solidFill>
+                      <a:prstDash val="solid"/>
+                      <a:round/>
+                      <a:headEnd type="none" w="med" len="med"/>
+                      <a:tailEnd type="none" w="med" len="med"/>
                     </a:lnR>
                     <a:lnT w="38100" cap="flat" cmpd="sng" algn="ctr">
                       <a:solidFill>
@@ -16568,11 +16632,14 @@
                     </a:p>
                   </a:txBody>
                   <a:tcPr marL="98405" marR="59043" marT="59043" marB="59043" anchor="b">
-                    <a:lnL w="38100" cap="flat" cmpd="sng" algn="ctr">
-                      <a:solidFill>
-                        <a:srgbClr val="FFFFFF"/>
-                      </a:solidFill>
-                      <a:prstDash val="solid"/>
+                    <a:lnL w="12700" cap="flat" cmpd="sng" algn="ctr">
+                      <a:solidFill>
+                        <a:schemeClr val="tx1"/>
+                      </a:solidFill>
+                      <a:prstDash val="solid"/>
+                      <a:round/>
+                      <a:headEnd type="none" w="med" len="med"/>
+                      <a:tailEnd type="none" w="med" len="med"/>
                     </a:lnL>
                     <a:lnR w="38100" cap="flat" cmpd="sng" algn="ctr">
                       <a:solidFill>
@@ -16895,9 +16962,14 @@
                       </a:solidFill>
                       <a:prstDash val="solid"/>
                     </a:lnL>
-                    <a:lnR w="12700" cmpd="sng">
-                      <a:noFill/>
-                      <a:prstDash val="solid"/>
+                    <a:lnR w="12700" cap="flat" cmpd="sng" algn="ctr">
+                      <a:solidFill>
+                        <a:schemeClr val="tx1"/>
+                      </a:solidFill>
+                      <a:prstDash val="solid"/>
+                      <a:round/>
+                      <a:headEnd type="none" w="med" len="med"/>
+                      <a:tailEnd type="none" w="med" len="med"/>
                     </a:lnR>
                     <a:lnT w="38100" cap="flat" cmpd="sng" algn="ctr">
                       <a:solidFill>
@@ -17075,11 +17147,14 @@
                       <a:headEnd type="none" w="med" len="med"/>
                       <a:tailEnd type="none" w="med" len="med"/>
                     </a:lnL>
-                    <a:lnR w="38100" cap="flat" cmpd="sng" algn="ctr">
-                      <a:solidFill>
-                        <a:srgbClr val="FFFFFF"/>
-                      </a:solidFill>
-                      <a:prstDash val="solid"/>
+                    <a:lnR w="12700" cap="flat" cmpd="sng" algn="ctr">
+                      <a:solidFill>
+                        <a:schemeClr val="tx1"/>
+                      </a:solidFill>
+                      <a:prstDash val="solid"/>
+                      <a:round/>
+                      <a:headEnd type="none" w="med" len="med"/>
+                      <a:tailEnd type="none" w="med" len="med"/>
                     </a:lnR>
                     <a:lnT w="38100" cap="flat" cmpd="sng" algn="ctr">
                       <a:solidFill>
@@ -17131,11 +17206,14 @@
                     </a:p>
                   </a:txBody>
                   <a:tcPr marL="98405" marR="59043" marT="59043" marB="59043" anchor="b">
-                    <a:lnL w="38100" cap="flat" cmpd="sng" algn="ctr">
-                      <a:solidFill>
-                        <a:srgbClr val="FFFFFF"/>
-                      </a:solidFill>
-                      <a:prstDash val="solid"/>
+                    <a:lnL w="12700" cap="flat" cmpd="sng" algn="ctr">
+                      <a:solidFill>
+                        <a:schemeClr val="tx1"/>
+                      </a:solidFill>
+                      <a:prstDash val="solid"/>
+                      <a:round/>
+                      <a:headEnd type="none" w="med" len="med"/>
+                      <a:tailEnd type="none" w="med" len="med"/>
                     </a:lnL>
                     <a:lnR w="38100" cap="flat" cmpd="sng" algn="ctr">
                       <a:solidFill>
@@ -17458,9 +17536,14 @@
                       </a:solidFill>
                       <a:prstDash val="solid"/>
                     </a:lnL>
-                    <a:lnR w="38100" cap="flat" cmpd="sng" algn="ctr">
-                      <a:noFill/>
-                      <a:prstDash val="solid"/>
+                    <a:lnR w="12700" cap="flat" cmpd="sng" algn="ctr">
+                      <a:solidFill>
+                        <a:schemeClr val="tx1"/>
+                      </a:solidFill>
+                      <a:prstDash val="solid"/>
+                      <a:round/>
+                      <a:headEnd type="none" w="med" len="med"/>
+                      <a:tailEnd type="none" w="med" len="med"/>
                     </a:lnR>
                     <a:lnT w="38100" cap="flat" cmpd="sng" algn="ctr">
                       <a:solidFill>
@@ -17662,11 +17745,14 @@
                       <a:headEnd type="none" w="med" len="med"/>
                       <a:tailEnd type="none" w="med" len="med"/>
                     </a:lnL>
-                    <a:lnR w="38100" cap="flat" cmpd="sng" algn="ctr">
-                      <a:solidFill>
-                        <a:srgbClr val="FFFFFF"/>
-                      </a:solidFill>
-                      <a:prstDash val="solid"/>
+                    <a:lnR w="12700" cap="flat" cmpd="sng" algn="ctr">
+                      <a:solidFill>
+                        <a:schemeClr val="tx1"/>
+                      </a:solidFill>
+                      <a:prstDash val="solid"/>
+                      <a:round/>
+                      <a:headEnd type="none" w="med" len="med"/>
+                      <a:tailEnd type="none" w="med" len="med"/>
                     </a:lnR>
                     <a:lnT w="38100" cap="flat" cmpd="sng" algn="ctr">
                       <a:solidFill>
@@ -17718,11 +17804,14 @@
                     </a:p>
                   </a:txBody>
                   <a:tcPr marL="98405" marR="59043" marT="59043" marB="59043" anchor="b">
-                    <a:lnL w="38100" cap="flat" cmpd="sng" algn="ctr">
-                      <a:solidFill>
-                        <a:srgbClr val="FFFFFF"/>
-                      </a:solidFill>
-                      <a:prstDash val="solid"/>
+                    <a:lnL w="12700" cap="flat" cmpd="sng" algn="ctr">
+                      <a:solidFill>
+                        <a:schemeClr val="tx1"/>
+                      </a:solidFill>
+                      <a:prstDash val="solid"/>
+                      <a:round/>
+                      <a:headEnd type="none" w="med" len="med"/>
+                      <a:tailEnd type="none" w="med" len="med"/>
                     </a:lnL>
                     <a:lnR w="38100" cap="flat" cmpd="sng" algn="ctr">
                       <a:solidFill>
@@ -18045,9 +18134,14 @@
                       </a:solidFill>
                       <a:prstDash val="solid"/>
                     </a:lnL>
-                    <a:lnR w="12700" cmpd="sng">
-                      <a:noFill/>
-                      <a:prstDash val="solid"/>
+                    <a:lnR w="12700" cap="flat" cmpd="sng" algn="ctr">
+                      <a:solidFill>
+                        <a:schemeClr val="tx1"/>
+                      </a:solidFill>
+                      <a:prstDash val="solid"/>
+                      <a:round/>
+                      <a:headEnd type="none" w="med" len="med"/>
+                      <a:tailEnd type="none" w="med" len="med"/>
                     </a:lnR>
                     <a:lnT w="38100" cap="flat" cmpd="sng" algn="ctr">
                       <a:solidFill>
@@ -18234,11 +18328,14 @@
                       <a:headEnd type="none" w="med" len="med"/>
                       <a:tailEnd type="none" w="med" len="med"/>
                     </a:lnL>
-                    <a:lnR w="38100" cap="flat" cmpd="sng" algn="ctr">
-                      <a:solidFill>
-                        <a:srgbClr val="FFFFFF"/>
-                      </a:solidFill>
-                      <a:prstDash val="solid"/>
+                    <a:lnR w="12700" cap="flat" cmpd="sng" algn="ctr">
+                      <a:solidFill>
+                        <a:schemeClr val="tx1"/>
+                      </a:solidFill>
+                      <a:prstDash val="solid"/>
+                      <a:round/>
+                      <a:headEnd type="none" w="med" len="med"/>
+                      <a:tailEnd type="none" w="med" len="med"/>
                     </a:lnR>
                     <a:lnT w="38100" cap="flat" cmpd="sng" algn="ctr">
                       <a:solidFill>
@@ -18290,11 +18387,14 @@
                     </a:p>
                   </a:txBody>
                   <a:tcPr marL="98405" marR="59043" marT="59043" marB="59043" anchor="b">
-                    <a:lnL w="38100" cap="flat" cmpd="sng" algn="ctr">
-                      <a:solidFill>
-                        <a:srgbClr val="FFFFFF"/>
-                      </a:solidFill>
-                      <a:prstDash val="solid"/>
+                    <a:lnL w="12700" cap="flat" cmpd="sng" algn="ctr">
+                      <a:solidFill>
+                        <a:schemeClr val="tx1"/>
+                      </a:solidFill>
+                      <a:prstDash val="solid"/>
+                      <a:round/>
+                      <a:headEnd type="none" w="med" len="med"/>
+                      <a:tailEnd type="none" w="med" len="med"/>
                     </a:lnL>
                     <a:lnR w="38100" cap="flat" cmpd="sng" algn="ctr">
                       <a:solidFill>
@@ -18617,9 +18717,14 @@
                       </a:solidFill>
                       <a:prstDash val="solid"/>
                     </a:lnL>
-                    <a:lnR w="38100" cap="flat" cmpd="sng" algn="ctr">
-                      <a:noFill/>
-                      <a:prstDash val="solid"/>
+                    <a:lnR w="12700" cap="flat" cmpd="sng" algn="ctr">
+                      <a:solidFill>
+                        <a:schemeClr val="tx1"/>
+                      </a:solidFill>
+                      <a:prstDash val="solid"/>
+                      <a:round/>
+                      <a:headEnd type="none" w="med" len="med"/>
+                      <a:tailEnd type="none" w="med" len="med"/>
                     </a:lnR>
                     <a:lnT w="38100" cap="flat" cmpd="sng" algn="ctr">
                       <a:solidFill>
@@ -18797,11 +18902,14 @@
                       <a:headEnd type="none" w="med" len="med"/>
                       <a:tailEnd type="none" w="med" len="med"/>
                     </a:lnL>
-                    <a:lnR w="38100" cap="flat" cmpd="sng" algn="ctr">
-                      <a:solidFill>
-                        <a:srgbClr val="FFFFFF"/>
-                      </a:solidFill>
-                      <a:prstDash val="solid"/>
+                    <a:lnR w="12700" cap="flat" cmpd="sng" algn="ctr">
+                      <a:solidFill>
+                        <a:schemeClr val="tx1"/>
+                      </a:solidFill>
+                      <a:prstDash val="solid"/>
+                      <a:round/>
+                      <a:headEnd type="none" w="med" len="med"/>
+                      <a:tailEnd type="none" w="med" len="med"/>
                     </a:lnR>
                     <a:lnT w="38100" cap="flat" cmpd="sng" algn="ctr">
                       <a:solidFill>
@@ -18865,11 +18973,14 @@
                     </a:p>
                   </a:txBody>
                   <a:tcPr marL="98405" marR="59043" marT="59043" marB="59043" anchor="b">
-                    <a:lnL w="38100" cap="flat" cmpd="sng" algn="ctr">
-                      <a:solidFill>
-                        <a:srgbClr val="FFFFFF"/>
-                      </a:solidFill>
-                      <a:prstDash val="solid"/>
+                    <a:lnL w="12700" cap="flat" cmpd="sng" algn="ctr">
+                      <a:solidFill>
+                        <a:schemeClr val="tx1"/>
+                      </a:solidFill>
+                      <a:prstDash val="solid"/>
+                      <a:round/>
+                      <a:headEnd type="none" w="med" len="med"/>
+                      <a:tailEnd type="none" w="med" len="med"/>
                     </a:lnL>
                     <a:lnR w="38100" cap="flat" cmpd="sng" algn="ctr">
                       <a:solidFill>
@@ -19192,9 +19303,14 @@
                       </a:solidFill>
                       <a:prstDash val="solid"/>
                     </a:lnL>
-                    <a:lnR w="12700" cmpd="sng">
-                      <a:noFill/>
-                      <a:prstDash val="solid"/>
+                    <a:lnR w="12700" cap="flat" cmpd="sng" algn="ctr">
+                      <a:solidFill>
+                        <a:schemeClr val="tx1"/>
+                      </a:solidFill>
+                      <a:prstDash val="solid"/>
+                      <a:round/>
+                      <a:headEnd type="none" w="med" len="med"/>
+                      <a:tailEnd type="none" w="med" len="med"/>
                     </a:lnR>
                     <a:lnT w="38100" cap="flat" cmpd="sng" algn="ctr">
                       <a:solidFill>
@@ -19396,11 +19512,14 @@
                       <a:headEnd type="none" w="med" len="med"/>
                       <a:tailEnd type="none" w="med" len="med"/>
                     </a:lnL>
-                    <a:lnR w="38100" cap="flat" cmpd="sng" algn="ctr">
-                      <a:solidFill>
-                        <a:srgbClr val="FFFFFF"/>
-                      </a:solidFill>
-                      <a:prstDash val="solid"/>
+                    <a:lnR w="12700" cap="flat" cmpd="sng" algn="ctr">
+                      <a:solidFill>
+                        <a:schemeClr val="tx1"/>
+                      </a:solidFill>
+                      <a:prstDash val="solid"/>
+                      <a:round/>
+                      <a:headEnd type="none" w="med" len="med"/>
+                      <a:tailEnd type="none" w="med" len="med"/>
                     </a:lnR>
                     <a:lnT w="38100" cap="flat" cmpd="sng" algn="ctr">
                       <a:solidFill>
@@ -19452,11 +19571,14 @@
                     </a:p>
                   </a:txBody>
                   <a:tcPr marL="98405" marR="59043" marT="59043" marB="59043" anchor="b">
-                    <a:lnL w="38100" cap="flat" cmpd="sng" algn="ctr">
-                      <a:solidFill>
-                        <a:srgbClr val="FFFFFF"/>
-                      </a:solidFill>
-                      <a:prstDash val="solid"/>
+                    <a:lnL w="12700" cap="flat" cmpd="sng" algn="ctr">
+                      <a:solidFill>
+                        <a:schemeClr val="tx1"/>
+                      </a:solidFill>
+                      <a:prstDash val="solid"/>
+                      <a:round/>
+                      <a:headEnd type="none" w="med" len="med"/>
+                      <a:tailEnd type="none" w="med" len="med"/>
                     </a:lnL>
                     <a:lnR w="38100" cap="flat" cmpd="sng" algn="ctr">
                       <a:solidFill>
@@ -19779,9 +19901,14 @@
                       </a:solidFill>
                       <a:prstDash val="solid"/>
                     </a:lnL>
-                    <a:lnR w="38100" cap="flat" cmpd="sng" algn="ctr">
-                      <a:noFill/>
-                      <a:prstDash val="solid"/>
+                    <a:lnR w="12700" cap="flat" cmpd="sng" algn="ctr">
+                      <a:solidFill>
+                        <a:schemeClr val="tx1"/>
+                      </a:solidFill>
+                      <a:prstDash val="solid"/>
+                      <a:round/>
+                      <a:headEnd type="none" w="med" len="med"/>
+                      <a:tailEnd type="none" w="med" len="med"/>
                     </a:lnR>
                     <a:lnT w="38100" cap="flat" cmpd="sng" algn="ctr">
                       <a:solidFill>
@@ -19968,11 +20095,14 @@
                       <a:headEnd type="none" w="med" len="med"/>
                       <a:tailEnd type="none" w="med" len="med"/>
                     </a:lnL>
-                    <a:lnR w="38100" cap="flat" cmpd="sng" algn="ctr">
-                      <a:solidFill>
-                        <a:srgbClr val="FFFFFF"/>
-                      </a:solidFill>
-                      <a:prstDash val="solid"/>
+                    <a:lnR w="12700" cap="flat" cmpd="sng" algn="ctr">
+                      <a:solidFill>
+                        <a:schemeClr val="tx1"/>
+                      </a:solidFill>
+                      <a:prstDash val="solid"/>
+                      <a:round/>
+                      <a:headEnd type="none" w="med" len="med"/>
+                      <a:tailEnd type="none" w="med" len="med"/>
                     </a:lnR>
                     <a:lnT w="38100" cap="flat" cmpd="sng" algn="ctr">
                       <a:solidFill>
@@ -20024,11 +20154,14 @@
                     </a:p>
                   </a:txBody>
                   <a:tcPr marL="98405" marR="59043" marT="59043" marB="59043" anchor="b">
-                    <a:lnL w="38100" cap="flat" cmpd="sng" algn="ctr">
-                      <a:solidFill>
-                        <a:srgbClr val="FFFFFF"/>
-                      </a:solidFill>
-                      <a:prstDash val="solid"/>
+                    <a:lnL w="12700" cap="flat" cmpd="sng" algn="ctr">
+                      <a:solidFill>
+                        <a:schemeClr val="tx1"/>
+                      </a:solidFill>
+                      <a:prstDash val="solid"/>
+                      <a:round/>
+                      <a:headEnd type="none" w="med" len="med"/>
+                      <a:tailEnd type="none" w="med" len="med"/>
                     </a:lnL>
                     <a:lnR w="38100" cap="flat" cmpd="sng" algn="ctr">
                       <a:solidFill>
@@ -20351,9 +20484,14 @@
                       </a:solidFill>
                       <a:prstDash val="solid"/>
                     </a:lnL>
-                    <a:lnR w="12700" cmpd="sng">
-                      <a:noFill/>
-                      <a:prstDash val="solid"/>
+                    <a:lnR w="12700" cap="flat" cmpd="sng" algn="ctr">
+                      <a:solidFill>
+                        <a:schemeClr val="tx1"/>
+                      </a:solidFill>
+                      <a:prstDash val="solid"/>
+                      <a:round/>
+                      <a:headEnd type="none" w="med" len="med"/>
+                      <a:tailEnd type="none" w="med" len="med"/>
                     </a:lnR>
                     <a:lnT w="38100" cap="flat" cmpd="sng" algn="ctr">
                       <a:solidFill>
@@ -20531,11 +20669,14 @@
                       <a:headEnd type="none" w="med" len="med"/>
                       <a:tailEnd type="none" w="med" len="med"/>
                     </a:lnL>
-                    <a:lnR w="38100" cap="flat" cmpd="sng" algn="ctr">
-                      <a:solidFill>
-                        <a:srgbClr val="FFFFFF"/>
-                      </a:solidFill>
-                      <a:prstDash val="solid"/>
+                    <a:lnR w="12700" cap="flat" cmpd="sng" algn="ctr">
+                      <a:solidFill>
+                        <a:schemeClr val="tx1"/>
+                      </a:solidFill>
+                      <a:prstDash val="solid"/>
+                      <a:round/>
+                      <a:headEnd type="none" w="med" len="med"/>
+                      <a:tailEnd type="none" w="med" len="med"/>
                     </a:lnR>
                     <a:lnT w="38100" cap="flat" cmpd="sng" algn="ctr">
                       <a:solidFill>
@@ -20587,11 +20728,14 @@
                     </a:p>
                   </a:txBody>
                   <a:tcPr marL="98405" marR="59043" marT="59043" marB="59043" anchor="b">
-                    <a:lnL w="38100" cap="flat" cmpd="sng" algn="ctr">
-                      <a:solidFill>
-                        <a:srgbClr val="FFFFFF"/>
-                      </a:solidFill>
-                      <a:prstDash val="solid"/>
+                    <a:lnL w="12700" cap="flat" cmpd="sng" algn="ctr">
+                      <a:solidFill>
+                        <a:schemeClr val="tx1"/>
+                      </a:solidFill>
+                      <a:prstDash val="solid"/>
+                      <a:round/>
+                      <a:headEnd type="none" w="med" len="med"/>
+                      <a:tailEnd type="none" w="med" len="med"/>
                     </a:lnL>
                     <a:lnR w="38100" cap="flat" cmpd="sng" algn="ctr">
                       <a:solidFill>
@@ -20605,11 +20749,14 @@
                       </a:solidFill>
                       <a:prstDash val="solid"/>
                     </a:lnT>
-                    <a:lnB w="38100" cap="flat" cmpd="sng" algn="ctr">
-                      <a:solidFill>
-                        <a:srgbClr val="FFFFFF"/>
-                      </a:solidFill>
-                      <a:prstDash val="solid"/>
+                    <a:lnB w="12700" cap="flat" cmpd="sng" algn="ctr">
+                      <a:solidFill>
+                        <a:schemeClr val="tx1"/>
+                      </a:solidFill>
+                      <a:prstDash val="solid"/>
+                      <a:round/>
+                      <a:headEnd type="none" w="med" len="med"/>
+                      <a:tailEnd type="none" w="med" len="med"/>
                     </a:lnB>
                     <a:solidFill>
                       <a:srgbClr val="878E8B">
@@ -20667,11 +20814,14 @@
                       </a:solidFill>
                       <a:prstDash val="solid"/>
                     </a:lnT>
-                    <a:lnB w="38100" cap="flat" cmpd="sng" algn="ctr">
-                      <a:solidFill>
-                        <a:srgbClr val="FFFFFF"/>
-                      </a:solidFill>
-                      <a:prstDash val="solid"/>
+                    <a:lnB w="12700" cap="flat" cmpd="sng" algn="ctr">
+                      <a:solidFill>
+                        <a:schemeClr val="tx1"/>
+                      </a:solidFill>
+                      <a:prstDash val="solid"/>
+                      <a:round/>
+                      <a:headEnd type="none" w="med" len="med"/>
+                      <a:tailEnd type="none" w="med" len="med"/>
                     </a:lnB>
                     <a:solidFill>
                       <a:srgbClr val="878E8B">
@@ -20720,11 +20870,14 @@
                       </a:solidFill>
                       <a:prstDash val="solid"/>
                     </a:lnT>
-                    <a:lnB w="38100" cap="flat" cmpd="sng" algn="ctr">
-                      <a:solidFill>
-                        <a:srgbClr val="FFFFFF"/>
-                      </a:solidFill>
-                      <a:prstDash val="solid"/>
+                    <a:lnB w="12700" cap="flat" cmpd="sng" algn="ctr">
+                      <a:solidFill>
+                        <a:schemeClr val="tx1"/>
+                      </a:solidFill>
+                      <a:prstDash val="solid"/>
+                      <a:round/>
+                      <a:headEnd type="none" w="med" len="med"/>
+                      <a:tailEnd type="none" w="med" len="med"/>
                     </a:lnB>
                     <a:solidFill>
                       <a:srgbClr val="878E8B">
@@ -20772,11 +20925,14 @@
                       </a:solidFill>
                       <a:prstDash val="solid"/>
                     </a:lnT>
-                    <a:lnB w="38100" cap="flat" cmpd="sng" algn="ctr">
-                      <a:solidFill>
-                        <a:srgbClr val="FFFFFF"/>
-                      </a:solidFill>
-                      <a:prstDash val="solid"/>
+                    <a:lnB w="12700" cap="flat" cmpd="sng" algn="ctr">
+                      <a:solidFill>
+                        <a:schemeClr val="tx1"/>
+                      </a:solidFill>
+                      <a:prstDash val="solid"/>
+                      <a:round/>
+                      <a:headEnd type="none" w="med" len="med"/>
+                      <a:tailEnd type="none" w="med" len="med"/>
                     </a:lnB>
                     <a:solidFill>
                       <a:srgbClr val="878E8B">
@@ -20824,11 +20980,14 @@
                       </a:solidFill>
                       <a:prstDash val="solid"/>
                     </a:lnT>
-                    <a:lnB w="38100" cap="flat" cmpd="sng" algn="ctr">
-                      <a:solidFill>
-                        <a:srgbClr val="FFFFFF"/>
-                      </a:solidFill>
-                      <a:prstDash val="solid"/>
+                    <a:lnB w="12700" cap="flat" cmpd="sng" algn="ctr">
+                      <a:solidFill>
+                        <a:schemeClr val="tx1"/>
+                      </a:solidFill>
+                      <a:prstDash val="solid"/>
+                      <a:round/>
+                      <a:headEnd type="none" w="med" len="med"/>
+                      <a:tailEnd type="none" w="med" len="med"/>
                     </a:lnB>
                     <a:solidFill>
                       <a:srgbClr val="878E8B">
@@ -20876,11 +21035,14 @@
                       </a:solidFill>
                       <a:prstDash val="solid"/>
                     </a:lnT>
-                    <a:lnB w="38100" cap="flat" cmpd="sng" algn="ctr">
-                      <a:solidFill>
-                        <a:srgbClr val="FFFFFF"/>
-                      </a:solidFill>
-                      <a:prstDash val="solid"/>
+                    <a:lnB w="12700" cap="flat" cmpd="sng" algn="ctr">
+                      <a:solidFill>
+                        <a:schemeClr val="tx1"/>
+                      </a:solidFill>
+                      <a:prstDash val="solid"/>
+                      <a:round/>
+                      <a:headEnd type="none" w="med" len="med"/>
+                      <a:tailEnd type="none" w="med" len="med"/>
                     </a:lnB>
                     <a:solidFill>
                       <a:srgbClr val="878E8B">
@@ -20914,9 +21076,14 @@
                       </a:solidFill>
                       <a:prstDash val="solid"/>
                     </a:lnL>
-                    <a:lnR w="38100" cap="flat" cmpd="sng" algn="ctr">
-                      <a:noFill/>
-                      <a:prstDash val="solid"/>
+                    <a:lnR w="12700" cap="flat" cmpd="sng" algn="ctr">
+                      <a:solidFill>
+                        <a:schemeClr val="tx1"/>
+                      </a:solidFill>
+                      <a:prstDash val="solid"/>
+                      <a:round/>
+                      <a:headEnd type="none" w="med" len="med"/>
+                      <a:tailEnd type="none" w="med" len="med"/>
                     </a:lnR>
                     <a:lnT w="38100" cap="flat" cmpd="sng" algn="ctr">
                       <a:solidFill>
@@ -20924,11 +21091,14 @@
                       </a:solidFill>
                       <a:prstDash val="solid"/>
                     </a:lnT>
-                    <a:lnB w="38100" cap="flat" cmpd="sng" algn="ctr">
-                      <a:solidFill>
-                        <a:srgbClr val="FFFFFF"/>
-                      </a:solidFill>
-                      <a:prstDash val="solid"/>
+                    <a:lnB w="12700" cap="flat" cmpd="sng" algn="ctr">
+                      <a:solidFill>
+                        <a:schemeClr val="tx1"/>
+                      </a:solidFill>
+                      <a:prstDash val="solid"/>
+                      <a:round/>
+                      <a:headEnd type="none" w="med" len="med"/>
+                      <a:tailEnd type="none" w="med" len="med"/>
                     </a:lnB>
                     <a:solidFill>
                       <a:srgbClr val="878E8B">
@@ -21174,11 +21344,14 @@
                       </a:solidFill>
                       <a:prstDash val="solid"/>
                     </a:lnR>
-                    <a:lnT w="38100" cap="flat" cmpd="sng" algn="ctr">
-                      <a:solidFill>
-                        <a:srgbClr val="FFFFFF"/>
-                      </a:solidFill>
-                      <a:prstDash val="solid"/>
+                    <a:lnT w="12700" cap="flat" cmpd="sng" algn="ctr">
+                      <a:solidFill>
+                        <a:schemeClr val="tx1"/>
+                      </a:solidFill>
+                      <a:prstDash val="solid"/>
+                      <a:round/>
+                      <a:headEnd type="none" w="med" len="med"/>
+                      <a:tailEnd type="none" w="med" len="med"/>
                     </a:lnT>
                     <a:lnB w="38100" cap="flat" cmpd="sng" algn="ctr">
                       <a:solidFill>
@@ -21224,11 +21397,14 @@
                       </a:solidFill>
                       <a:prstDash val="solid"/>
                     </a:lnR>
-                    <a:lnT w="38100" cap="flat" cmpd="sng" algn="ctr">
-                      <a:solidFill>
-                        <a:srgbClr val="FFFFFF"/>
-                      </a:solidFill>
-                      <a:prstDash val="solid"/>
+                    <a:lnT w="12700" cap="flat" cmpd="sng" algn="ctr">
+                      <a:solidFill>
+                        <a:schemeClr val="tx1"/>
+                      </a:solidFill>
+                      <a:prstDash val="solid"/>
+                      <a:round/>
+                      <a:headEnd type="none" w="med" len="med"/>
+                      <a:tailEnd type="none" w="med" len="med"/>
                     </a:lnT>
                     <a:lnB w="38100" cap="flat" cmpd="sng" algn="ctr">
                       <a:solidFill>
@@ -21274,11 +21450,14 @@
                       </a:solidFill>
                       <a:prstDash val="solid"/>
                     </a:lnR>
-                    <a:lnT w="38100" cap="flat" cmpd="sng" algn="ctr">
-                      <a:solidFill>
-                        <a:srgbClr val="FFFFFF"/>
-                      </a:solidFill>
-                      <a:prstDash val="solid"/>
+                    <a:lnT w="12700" cap="flat" cmpd="sng" algn="ctr">
+                      <a:solidFill>
+                        <a:schemeClr val="tx1"/>
+                      </a:solidFill>
+                      <a:prstDash val="solid"/>
+                      <a:round/>
+                      <a:headEnd type="none" w="med" len="med"/>
+                      <a:tailEnd type="none" w="med" len="med"/>
                     </a:lnT>
                     <a:lnB w="38100" cap="flat" cmpd="sng" algn="ctr">
                       <a:solidFill>
@@ -21324,9 +21503,9 @@
                       </a:solidFill>
                       <a:prstDash val="solid"/>
                     </a:lnR>
-                    <a:lnT w="38100" cap="flat" cmpd="sng" algn="ctr">
-                      <a:solidFill>
-                        <a:srgbClr val="FFFFFF"/>
+                    <a:lnT w="12700" cap="flat" cmpd="sng" algn="ctr">
+                      <a:solidFill>
+                        <a:schemeClr val="tx1"/>
                       </a:solidFill>
                       <a:prstDash val="solid"/>
                       <a:round/>
@@ -21377,9 +21556,9 @@
                       </a:solidFill>
                       <a:prstDash val="solid"/>
                     </a:lnR>
-                    <a:lnT w="38100" cap="flat" cmpd="sng" algn="ctr">
-                      <a:solidFill>
-                        <a:srgbClr val="FFFFFF"/>
+                    <a:lnT w="12700" cap="flat" cmpd="sng" algn="ctr">
+                      <a:solidFill>
+                        <a:schemeClr val="tx1"/>
                       </a:solidFill>
                       <a:prstDash val="solid"/>
                       <a:round/>
@@ -21430,9 +21609,9 @@
                       </a:solidFill>
                       <a:prstDash val="solid"/>
                     </a:lnR>
-                    <a:lnT w="38100" cap="flat" cmpd="sng" algn="ctr">
-                      <a:solidFill>
-                        <a:srgbClr val="FFFFFF"/>
+                    <a:lnT w="12700" cap="flat" cmpd="sng" algn="ctr">
+                      <a:solidFill>
+                        <a:schemeClr val="tx1"/>
                       </a:solidFill>
                       <a:prstDash val="solid"/>
                       <a:round/>
@@ -21481,9 +21660,9 @@
                       <a:noFill/>
                       <a:prstDash val="solid"/>
                     </a:lnR>
-                    <a:lnT w="38100" cap="flat" cmpd="sng" algn="ctr">
-                      <a:solidFill>
-                        <a:srgbClr val="FFFFFF"/>
+                    <a:lnT w="12700" cap="flat" cmpd="sng" algn="ctr">
+                      <a:solidFill>
+                        <a:schemeClr val="tx1"/>
                       </a:solidFill>
                       <a:prstDash val="solid"/>
                       <a:round/>
@@ -21688,7 +21867,7 @@
                     <a:lstStyle/>
                     <a:p>
                       <a:pPr algn="l" fontAlgn="b"/>
-                      <a:endParaRPr lang="en-US" sz="1200" b="0" i="0" u="none" strike="noStrike">
+                      <a:endParaRPr lang="en-US" sz="1200" b="0" i="0" u="none" strike="noStrike" dirty="0">
                         <a:solidFill>
                           <a:schemeClr val="tx1">
                             <a:lumMod val="85000"/>
@@ -22607,8 +22786,8 @@
         </p:nvSpPr>
         <p:spPr>
           <a:xfrm>
-            <a:off x="363039" y="5008522"/>
-            <a:ext cx="4150964" cy="1384995"/>
+            <a:off x="363038" y="5008522"/>
+            <a:ext cx="4214143" cy="1384995"/>
           </a:xfrm>
           <a:prstGeom prst="rect">
             <a:avLst/>
@@ -22629,7 +22808,87 @@
                   </a:schemeClr>
                 </a:solidFill>
               </a:rPr>
-              <a:t>FILTER('2016_full_marathon'!$D:$D,('2016_full_marathon'!$A:$A&lt;MIN('2016_full_marathon'!$A:$A)+3)*('2016_full_marathon'!$A:$A&lt;&gt;"")),</a:t>
+              <a:t>FILTER(‘sheet_name’!</a:t>
+            </a:r>
+            <a:r>
+              <a:rPr lang="en-US" sz="1200" dirty="0" err="1">
+                <a:solidFill>
+                  <a:schemeClr val="accent1">
+                    <a:lumMod val="75000"/>
+                  </a:schemeClr>
+                </a:solidFill>
+              </a:rPr>
+              <a:t>name_range</a:t>
+            </a:r>
+            <a:r>
+              <a:rPr lang="en-US" sz="1200" dirty="0">
+                <a:solidFill>
+                  <a:schemeClr val="accent1">
+                    <a:lumMod val="75000"/>
+                  </a:schemeClr>
+                </a:solidFill>
+              </a:rPr>
+              <a:t>,('sheet_name’!</a:t>
+            </a:r>
+            <a:r>
+              <a:rPr lang="en-US" sz="1200" dirty="0" err="1">
+                <a:solidFill>
+                  <a:schemeClr val="accent1">
+                    <a:lumMod val="75000"/>
+                  </a:schemeClr>
+                </a:solidFill>
+              </a:rPr>
+              <a:t>ID_range</a:t>
+            </a:r>
+            <a:r>
+              <a:rPr lang="en-US" sz="1200" dirty="0">
+                <a:solidFill>
+                  <a:schemeClr val="accent1">
+                    <a:lumMod val="75000"/>
+                  </a:schemeClr>
+                </a:solidFill>
+              </a:rPr>
+              <a:t>&lt;MIN(‘sheet_name’!</a:t>
+            </a:r>
+            <a:r>
+              <a:rPr lang="en-US" sz="1200" dirty="0" err="1">
+                <a:solidFill>
+                  <a:schemeClr val="accent1">
+                    <a:lumMod val="75000"/>
+                  </a:schemeClr>
+                </a:solidFill>
+              </a:rPr>
+              <a:t>ID_range</a:t>
+            </a:r>
+            <a:r>
+              <a:rPr lang="en-US" sz="1200" dirty="0">
+                <a:solidFill>
+                  <a:schemeClr val="accent1">
+                    <a:lumMod val="75000"/>
+                  </a:schemeClr>
+                </a:solidFill>
+              </a:rPr>
+              <a:t>)+3)*(‘sheet_name’!</a:t>
+            </a:r>
+            <a:r>
+              <a:rPr lang="en-US" sz="1200" dirty="0" err="1">
+                <a:solidFill>
+                  <a:schemeClr val="accent1">
+                    <a:lumMod val="75000"/>
+                  </a:schemeClr>
+                </a:solidFill>
+              </a:rPr>
+              <a:t>ID_range</a:t>
+            </a:r>
+            <a:r>
+              <a:rPr lang="en-US" sz="1200" dirty="0">
+                <a:solidFill>
+                  <a:schemeClr val="accent1">
+                    <a:lumMod val="75000"/>
+                  </a:schemeClr>
+                </a:solidFill>
+              </a:rPr>
+              <a:t>&lt;&gt;"")),</a:t>
             </a:r>
             <a:r>
               <a:rPr lang="en-US" sz="1200" dirty="0">

</xml_diff>